<commit_message>
New update for report
</commit_message>
<xml_diff>
--- a/Final_Report/Figure/1/Figures.pptx
+++ b/Final_Report/Figure/1/Figures.pptx
@@ -107,6 +107,11 @@
       </a:defRPr>
     </a:lvl9pPr>
   </p:defaultTextStyle>
+  <p:extLst>
+    <p:ext uri="{EFAFB233-063F-42B5-8137-9DF3F51BA10A}">
+      <p15:sldGuideLst xmlns:p15="http://schemas.microsoft.com/office/powerpoint/2012/main"/>
+    </p:ext>
+  </p:extLst>
 </p:presentation>
 </file>
 
@@ -192,7 +197,7 @@
           <a:p>
             <a:fld id="{49318B5F-233F-41E4-AA15-BDF30820056E}" type="datetimeFigureOut">
               <a:rPr lang="zh-CN" altLang="en-US" smtClean="0"/>
-              <a:t>2023/6/6</a:t>
+              <a:t>2023/6/8</a:t>
             </a:fld>
             <a:endParaRPr lang="zh-CN" altLang="en-US"/>
           </a:p>
@@ -679,7 +684,7 @@
           <a:p>
             <a:fld id="{CE8AD568-CCFA-4828-A70C-95715815D69A}" type="datetimeFigureOut">
               <a:rPr lang="zh-CN" altLang="en-US" smtClean="0"/>
-              <a:t>2023/6/6</a:t>
+              <a:t>2023/6/8</a:t>
             </a:fld>
             <a:endParaRPr lang="zh-CN" altLang="en-US"/>
           </a:p>
@@ -849,7 +854,7 @@
           <a:p>
             <a:fld id="{CE8AD568-CCFA-4828-A70C-95715815D69A}" type="datetimeFigureOut">
               <a:rPr lang="zh-CN" altLang="en-US" smtClean="0"/>
-              <a:t>2023/6/6</a:t>
+              <a:t>2023/6/8</a:t>
             </a:fld>
             <a:endParaRPr lang="zh-CN" altLang="en-US"/>
           </a:p>
@@ -1029,7 +1034,7 @@
           <a:p>
             <a:fld id="{CE8AD568-CCFA-4828-A70C-95715815D69A}" type="datetimeFigureOut">
               <a:rPr lang="zh-CN" altLang="en-US" smtClean="0"/>
-              <a:t>2023/6/6</a:t>
+              <a:t>2023/6/8</a:t>
             </a:fld>
             <a:endParaRPr lang="zh-CN" altLang="en-US"/>
           </a:p>
@@ -1199,7 +1204,7 @@
           <a:p>
             <a:fld id="{CE8AD568-CCFA-4828-A70C-95715815D69A}" type="datetimeFigureOut">
               <a:rPr lang="zh-CN" altLang="en-US" smtClean="0"/>
-              <a:t>2023/6/6</a:t>
+              <a:t>2023/6/8</a:t>
             </a:fld>
             <a:endParaRPr lang="zh-CN" altLang="en-US"/>
           </a:p>
@@ -1445,7 +1450,7 @@
           <a:p>
             <a:fld id="{CE8AD568-CCFA-4828-A70C-95715815D69A}" type="datetimeFigureOut">
               <a:rPr lang="zh-CN" altLang="en-US" smtClean="0"/>
-              <a:t>2023/6/6</a:t>
+              <a:t>2023/6/8</a:t>
             </a:fld>
             <a:endParaRPr lang="zh-CN" altLang="en-US"/>
           </a:p>
@@ -1677,7 +1682,7 @@
           <a:p>
             <a:fld id="{CE8AD568-CCFA-4828-A70C-95715815D69A}" type="datetimeFigureOut">
               <a:rPr lang="zh-CN" altLang="en-US" smtClean="0"/>
-              <a:t>2023/6/6</a:t>
+              <a:t>2023/6/8</a:t>
             </a:fld>
             <a:endParaRPr lang="zh-CN" altLang="en-US"/>
           </a:p>
@@ -2044,7 +2049,7 @@
           <a:p>
             <a:fld id="{CE8AD568-CCFA-4828-A70C-95715815D69A}" type="datetimeFigureOut">
               <a:rPr lang="zh-CN" altLang="en-US" smtClean="0"/>
-              <a:t>2023/6/6</a:t>
+              <a:t>2023/6/8</a:t>
             </a:fld>
             <a:endParaRPr lang="zh-CN" altLang="en-US"/>
           </a:p>
@@ -2162,7 +2167,7 @@
           <a:p>
             <a:fld id="{CE8AD568-CCFA-4828-A70C-95715815D69A}" type="datetimeFigureOut">
               <a:rPr lang="zh-CN" altLang="en-US" smtClean="0"/>
-              <a:t>2023/6/6</a:t>
+              <a:t>2023/6/8</a:t>
             </a:fld>
             <a:endParaRPr lang="zh-CN" altLang="en-US"/>
           </a:p>
@@ -2257,7 +2262,7 @@
           <a:p>
             <a:fld id="{CE8AD568-CCFA-4828-A70C-95715815D69A}" type="datetimeFigureOut">
               <a:rPr lang="zh-CN" altLang="en-US" smtClean="0"/>
-              <a:t>2023/6/6</a:t>
+              <a:t>2023/6/8</a:t>
             </a:fld>
             <a:endParaRPr lang="zh-CN" altLang="en-US"/>
           </a:p>
@@ -2534,7 +2539,7 @@
           <a:p>
             <a:fld id="{CE8AD568-CCFA-4828-A70C-95715815D69A}" type="datetimeFigureOut">
               <a:rPr lang="zh-CN" altLang="en-US" smtClean="0"/>
-              <a:t>2023/6/6</a:t>
+              <a:t>2023/6/8</a:t>
             </a:fld>
             <a:endParaRPr lang="zh-CN" altLang="en-US"/>
           </a:p>
@@ -2791,7 +2796,7 @@
           <a:p>
             <a:fld id="{CE8AD568-CCFA-4828-A70C-95715815D69A}" type="datetimeFigureOut">
               <a:rPr lang="zh-CN" altLang="en-US" smtClean="0"/>
-              <a:t>2023/6/6</a:t>
+              <a:t>2023/6/8</a:t>
             </a:fld>
             <a:endParaRPr lang="zh-CN" altLang="en-US"/>
           </a:p>
@@ -3004,7 +3009,7 @@
           <a:p>
             <a:fld id="{CE8AD568-CCFA-4828-A70C-95715815D69A}" type="datetimeFigureOut">
               <a:rPr lang="zh-CN" altLang="en-US" smtClean="0"/>
-              <a:t>2023/6/6</a:t>
+              <a:t>2023/6/8</a:t>
             </a:fld>
             <a:endParaRPr lang="zh-CN" altLang="en-US"/>
           </a:p>
@@ -3467,7 +3472,7 @@
           <a:lstStyle/>
           <a:p>
             <a:pPr algn="ctr"/>
-            <a:endParaRPr lang="zh-CN" altLang="en-US" sz="2658"/>
+            <a:endParaRPr lang="zh-CN" altLang="en-US" sz="2658" b="1"/>
           </a:p>
         </p:txBody>
       </p:sp>
@@ -3710,8 +3715,8 @@
           </a:fontRef>
         </p:style>
       </p:cxnSp>
-      <mc:AlternateContent xmlns:mc="http://schemas.openxmlformats.org/markup-compatibility/2006">
-        <mc:Choice xmlns:a14="http://schemas.microsoft.com/office/drawing/2010/main" Requires="a14">
+      <mc:AlternateContent xmlns:mc="http://schemas.openxmlformats.org/markup-compatibility/2006" xmlns:a14="http://schemas.microsoft.com/office/drawing/2010/main">
+        <mc:Choice Requires="a14">
           <p:sp>
             <p:nvSpPr>
               <p:cNvPr id="38" name="文本框 37">
@@ -3740,6 +3745,7 @@
               </a:bodyPr>
               <a:lstStyle/>
               <a:p>
+                <a:pPr/>
                 <a14:m>
                   <m:oMathPara xmlns:m="http://schemas.openxmlformats.org/officeDocument/2006/math">
                     <m:oMathParaPr>
@@ -3749,37 +3755,37 @@
                       <m:sSub>
                         <m:sSubPr>
                           <m:ctrlPr>
-                            <a:rPr lang="en-US" altLang="zh-CN" sz="2400" i="1" smtClean="0">
+                            <a:rPr lang="en-US" altLang="zh-CN" sz="2400" b="1" i="1" smtClean="0">
                               <a:latin typeface="Cambria Math" panose="02040503050406030204" pitchFamily="18" charset="0"/>
                             </a:rPr>
                           </m:ctrlPr>
                         </m:sSubPr>
                         <m:e>
                           <m:r>
-                            <a:rPr lang="zh-CN" altLang="en-US" sz="2400" i="1" smtClean="0">
+                            <a:rPr lang="zh-CN" altLang="en-US" sz="2400" b="1" i="1" smtClean="0">
                               <a:latin typeface="Cambria Math" panose="02040503050406030204" pitchFamily="18" charset="0"/>
                             </a:rPr>
-                            <m:t>𝜑</m:t>
+                            <m:t>𝝋</m:t>
                           </m:r>
                         </m:e>
                         <m:sub>
                           <m:r>
-                            <a:rPr lang="en-US" altLang="zh-CN" sz="2400" b="0" i="1" smtClean="0">
+                            <a:rPr lang="en-US" altLang="zh-CN" sz="2400" b="1" i="1" smtClean="0">
                               <a:latin typeface="Cambria Math" panose="02040503050406030204" pitchFamily="18" charset="0"/>
                             </a:rPr>
-                            <m:t>0</m:t>
+                            <m:t>𝟎</m:t>
                           </m:r>
                         </m:sub>
                       </m:sSub>
                     </m:oMath>
                   </m:oMathPara>
                 </a14:m>
-                <a:endParaRPr lang="zh-CN" altLang="en-US" sz="2400" dirty="0"/>
+                <a:endParaRPr lang="zh-CN" altLang="en-US" sz="2400" b="1" dirty="0"/>
               </a:p>
             </p:txBody>
           </p:sp>
         </mc:Choice>
-        <mc:Fallback>
+        <mc:Fallback xmlns="">
           <p:sp>
             <p:nvSpPr>
               <p:cNvPr id="38" name="文本框 37">
@@ -3805,7 +3811,7 @@
               <a:blipFill>
                 <a:blip r:embed="rId3"/>
                 <a:stretch>
-                  <a:fillRect b="-10667"/>
+                  <a:fillRect b="-12000"/>
                 </a:stretch>
               </a:blipFill>
             </p:spPr>
@@ -3853,14 +3859,14 @@
           <a:lstStyle/>
           <a:p>
             <a:r>
-              <a:rPr lang="en-US" altLang="zh-CN" sz="2658" dirty="0">
+              <a:rPr lang="en-US" altLang="zh-CN" sz="2658" b="1" dirty="0">
                 <a:solidFill>
                   <a:srgbClr val="00B050"/>
                 </a:solidFill>
               </a:rPr>
               <a:t>Record</a:t>
             </a:r>
-            <a:endParaRPr lang="zh-CN" altLang="en-US" sz="2658" dirty="0">
+            <a:endParaRPr lang="zh-CN" altLang="en-US" sz="2658" b="1" dirty="0">
               <a:solidFill>
                 <a:srgbClr val="00B050"/>
               </a:solidFill>
@@ -3897,10 +3903,10 @@
           <a:lstStyle/>
           <a:p>
             <a:r>
-              <a:rPr lang="en-US" altLang="zh-CN" sz="2658" dirty="0"/>
+              <a:rPr lang="en-US" altLang="zh-CN" sz="2658" b="1" dirty="0"/>
               <a:t>……</a:t>
             </a:r>
-            <a:endParaRPr lang="zh-CN" altLang="en-US" sz="2658" dirty="0"/>
+            <a:endParaRPr lang="zh-CN" altLang="en-US" sz="2658" b="1" dirty="0"/>
           </a:p>
         </p:txBody>
       </p:sp>
@@ -3978,7 +3984,7 @@
           <a:lstStyle/>
           <a:p>
             <a:r>
-              <a:rPr lang="en-US" altLang="zh-CN" sz="2658" dirty="0">
+              <a:rPr lang="en-US" altLang="zh-CN" sz="2658" b="1" dirty="0">
                 <a:solidFill>
                   <a:schemeClr val="tx1">
                     <a:lumMod val="50000"/>
@@ -3988,7 +3994,7 @@
               </a:rPr>
               <a:t>TR</a:t>
             </a:r>
-            <a:endParaRPr lang="zh-CN" altLang="en-US" sz="2658" dirty="0">
+            <a:endParaRPr lang="zh-CN" altLang="en-US" sz="2658" b="1" dirty="0">
               <a:solidFill>
                 <a:schemeClr val="tx1">
                   <a:lumMod val="50000"/>
@@ -4075,7 +4081,7 @@
           <a:lstStyle/>
           <a:p>
             <a:r>
-              <a:rPr lang="en-US" altLang="zh-CN" sz="2658" dirty="0">
+              <a:rPr lang="en-US" altLang="zh-CN" sz="2658" b="1" dirty="0">
                 <a:solidFill>
                   <a:schemeClr val="tx1">
                     <a:lumMod val="50000"/>
@@ -4085,7 +4091,7 @@
               </a:rPr>
               <a:t>TE</a:t>
             </a:r>
-            <a:endParaRPr lang="zh-CN" altLang="en-US" sz="2658" dirty="0">
+            <a:endParaRPr lang="zh-CN" altLang="en-US" sz="2658" b="1" dirty="0">
               <a:solidFill>
                 <a:schemeClr val="tx1">
                   <a:lumMod val="50000"/>
@@ -4125,10 +4131,10 @@
           <a:lstStyle/>
           <a:p>
             <a:r>
-              <a:rPr lang="en-US" altLang="zh-CN" sz="2658" dirty="0"/>
+              <a:rPr lang="en-US" altLang="zh-CN" sz="2658" b="1" dirty="0"/>
               <a:t>N-periodic ka-SPGR sequence</a:t>
             </a:r>
-            <a:endParaRPr lang="zh-CN" altLang="en-US" sz="2658" dirty="0"/>
+            <a:endParaRPr lang="zh-CN" altLang="en-US" sz="2658" b="1" dirty="0"/>
           </a:p>
         </p:txBody>
       </p:sp>
@@ -4336,10 +4342,10 @@
           <a:lstStyle/>
           <a:p>
             <a:r>
-              <a:rPr lang="en-US" altLang="zh-CN" sz="2000" dirty="0" err="1"/>
+              <a:rPr lang="en-US" altLang="zh-CN" sz="2000" b="1" dirty="0" err="1"/>
               <a:t>Mxy</a:t>
             </a:r>
-            <a:endParaRPr lang="zh-CN" altLang="en-US" sz="2000" dirty="0"/>
+            <a:endParaRPr lang="zh-CN" altLang="en-US" sz="2000" b="1" dirty="0"/>
           </a:p>
         </p:txBody>
       </p:sp>
@@ -4372,10 +4378,10 @@
           <a:lstStyle/>
           <a:p>
             <a:r>
-              <a:rPr lang="en-US" altLang="zh-CN" sz="2000" dirty="0"/>
+              <a:rPr lang="en-US" altLang="zh-CN" sz="2000" b="1" dirty="0"/>
               <a:t>Off-resonance frequency (Hz)</a:t>
             </a:r>
-            <a:endParaRPr lang="zh-CN" altLang="en-US" sz="2000" dirty="0"/>
+            <a:endParaRPr lang="zh-CN" altLang="en-US" sz="2000" b="1" dirty="0"/>
           </a:p>
         </p:txBody>
       </p:sp>
@@ -4408,10 +4414,10 @@
           <a:lstStyle/>
           <a:p>
             <a:r>
-              <a:rPr lang="en-US" altLang="zh-CN" sz="2000" dirty="0"/>
+              <a:rPr lang="en-US" altLang="zh-CN" sz="2000" b="1" dirty="0"/>
               <a:t>F-state Magnitude</a:t>
             </a:r>
-            <a:endParaRPr lang="zh-CN" altLang="en-US" sz="2000" dirty="0"/>
+            <a:endParaRPr lang="zh-CN" altLang="en-US" sz="2000" b="1" dirty="0"/>
           </a:p>
         </p:txBody>
       </p:sp>
@@ -4444,10 +4450,10 @@
           <a:lstStyle/>
           <a:p>
             <a:r>
-              <a:rPr lang="en-US" altLang="zh-CN" sz="2000" dirty="0"/>
+              <a:rPr lang="en-US" altLang="zh-CN" sz="2000" b="1" dirty="0"/>
               <a:t>F-states</a:t>
             </a:r>
-            <a:endParaRPr lang="zh-CN" altLang="en-US" sz="2000" dirty="0"/>
+            <a:endParaRPr lang="zh-CN" altLang="en-US" sz="2000" b="1" dirty="0"/>
           </a:p>
         </p:txBody>
       </p:sp>
@@ -4480,10 +4486,10 @@
           <a:lstStyle/>
           <a:p>
             <a:r>
-              <a:rPr lang="en-US" altLang="zh-CN" sz="2000" dirty="0"/>
+              <a:rPr lang="en-US" altLang="zh-CN" sz="2000" b="1" dirty="0"/>
               <a:t>F-state Magnitude</a:t>
             </a:r>
-            <a:endParaRPr lang="zh-CN" altLang="en-US" sz="2000" dirty="0"/>
+            <a:endParaRPr lang="zh-CN" altLang="en-US" sz="2000" b="1" dirty="0"/>
           </a:p>
         </p:txBody>
       </p:sp>
@@ -4516,10 +4522,10 @@
           <a:lstStyle/>
           <a:p>
             <a:r>
-              <a:rPr lang="en-US" altLang="zh-CN" sz="2000" dirty="0"/>
+              <a:rPr lang="en-US" altLang="zh-CN" sz="2000" b="1" dirty="0"/>
               <a:t>F-states</a:t>
             </a:r>
-            <a:endParaRPr lang="zh-CN" altLang="en-US" sz="2000" dirty="0"/>
+            <a:endParaRPr lang="zh-CN" altLang="en-US" sz="2000" b="1" dirty="0"/>
           </a:p>
         </p:txBody>
       </p:sp>
@@ -4552,10 +4558,10 @@
           <a:lstStyle/>
           <a:p>
             <a:r>
-              <a:rPr lang="en-US" altLang="zh-CN" sz="2000" dirty="0"/>
+              <a:rPr lang="en-US" altLang="zh-CN" sz="2000" b="1" dirty="0"/>
               <a:t>F-state Magnitude</a:t>
             </a:r>
-            <a:endParaRPr lang="zh-CN" altLang="en-US" sz="2000" dirty="0"/>
+            <a:endParaRPr lang="zh-CN" altLang="en-US" sz="2000" b="1" dirty="0"/>
           </a:p>
         </p:txBody>
       </p:sp>
@@ -4588,10 +4594,10 @@
           <a:lstStyle/>
           <a:p>
             <a:r>
-              <a:rPr lang="en-US" altLang="zh-CN" sz="2000" dirty="0"/>
+              <a:rPr lang="en-US" altLang="zh-CN" sz="2000" b="1" dirty="0"/>
               <a:t>F-states</a:t>
             </a:r>
-            <a:endParaRPr lang="zh-CN" altLang="en-US" sz="2000" dirty="0"/>
+            <a:endParaRPr lang="zh-CN" altLang="en-US" sz="2000" b="1" dirty="0"/>
           </a:p>
         </p:txBody>
       </p:sp>
@@ -4624,10 +4630,10 @@
           <a:lstStyle/>
           <a:p>
             <a:r>
-              <a:rPr lang="en-US" altLang="zh-CN" sz="2000" dirty="0"/>
+              <a:rPr lang="en-US" altLang="zh-CN" sz="2000" b="1" dirty="0"/>
               <a:t>F-state Magnitude</a:t>
             </a:r>
-            <a:endParaRPr lang="zh-CN" altLang="en-US" sz="2000" dirty="0"/>
+            <a:endParaRPr lang="zh-CN" altLang="en-US" sz="2000" b="1" dirty="0"/>
           </a:p>
         </p:txBody>
       </p:sp>
@@ -4660,10 +4666,10 @@
           <a:lstStyle/>
           <a:p>
             <a:r>
-              <a:rPr lang="en-US" altLang="zh-CN" sz="2800" dirty="0"/>
+              <a:rPr lang="en-US" altLang="zh-CN" sz="2800" b="1" dirty="0"/>
               <a:t>Off-resonance Profile</a:t>
             </a:r>
-            <a:endParaRPr lang="zh-CN" altLang="en-US" sz="2800" dirty="0"/>
+            <a:endParaRPr lang="zh-CN" altLang="en-US" sz="2800" b="1" dirty="0"/>
           </a:p>
         </p:txBody>
       </p:sp>
@@ -4696,15 +4702,15 @@
           <a:lstStyle/>
           <a:p>
             <a:r>
-              <a:rPr lang="en-US" altLang="zh-CN" sz="2800" dirty="0"/>
+              <a:rPr lang="en-US" altLang="zh-CN" sz="2800" b="1" dirty="0"/>
               <a:t>F-state profile</a:t>
             </a:r>
-            <a:endParaRPr lang="zh-CN" altLang="en-US" sz="2800" dirty="0"/>
-          </a:p>
-        </p:txBody>
-      </p:sp>
-      <mc:AlternateContent xmlns:mc="http://schemas.openxmlformats.org/markup-compatibility/2006">
-        <mc:Choice xmlns:a14="http://schemas.microsoft.com/office/drawing/2010/main" Requires="a14">
+            <a:endParaRPr lang="zh-CN" altLang="en-US" sz="2800" b="1" dirty="0"/>
+          </a:p>
+        </p:txBody>
+      </p:sp>
+      <mc:AlternateContent xmlns:mc="http://schemas.openxmlformats.org/markup-compatibility/2006" xmlns:a14="http://schemas.microsoft.com/office/drawing/2010/main">
+        <mc:Choice Requires="a14">
           <p:sp>
             <p:nvSpPr>
               <p:cNvPr id="80" name="文本框 79">
@@ -4736,7 +4742,7 @@
                 <a14:m>
                   <m:oMath xmlns:m="http://schemas.openxmlformats.org/officeDocument/2006/math">
                     <m:r>
-                      <a:rPr lang="en-US" altLang="zh-CN" sz="2800" i="1" smtClean="0">
+                      <a:rPr lang="en-US" altLang="zh-CN" sz="2800" b="1" i="1" smtClean="0">
                         <a:latin typeface="Cambria Math" panose="02040503050406030204" pitchFamily="18" charset="0"/>
                         <a:ea typeface="Cambria Math" panose="02040503050406030204" pitchFamily="18" charset="0"/>
                       </a:rPr>
@@ -4751,27 +4757,27 @@
                   <a:t>F</a:t>
                 </a:r>
                 <a:r>
-                  <a:rPr lang="en-US" altLang="zh-CN" sz="2800" dirty="0">
+                  <a:rPr lang="en-US" altLang="zh-CN" sz="2800" b="1" dirty="0">
                     <a:latin typeface="Blackadder ITC" panose="04020505051007020D02" pitchFamily="82" charset="0"/>
                   </a:rPr>
                   <a:t> </a:t>
                 </a:r>
                 <a:r>
-                  <a:rPr lang="en-US" altLang="zh-CN" sz="2800" dirty="0">
+                  <a:rPr lang="en-US" altLang="zh-CN" sz="2800" b="1" dirty="0">
                     <a:latin typeface="+mj-lt"/>
                   </a:rPr>
                   <a:t>[</a:t>
                 </a:r>
                 <a:r>
-                  <a:rPr lang="en-US" altLang="zh-CN" sz="2800" dirty="0"/>
+                  <a:rPr lang="en-US" altLang="zh-CN" sz="2800" b="1" dirty="0"/>
                   <a:t>Lorentzian]</a:t>
                 </a:r>
-                <a:endParaRPr lang="zh-CN" altLang="en-US" sz="2800" dirty="0"/>
+                <a:endParaRPr lang="zh-CN" altLang="en-US" sz="2800" b="1" dirty="0"/>
               </a:p>
             </p:txBody>
           </p:sp>
         </mc:Choice>
-        <mc:Fallback>
+        <mc:Fallback xmlns="">
           <p:sp>
             <p:nvSpPr>
               <p:cNvPr id="80" name="文本框 79">
@@ -4797,7 +4803,7 @@
               <a:blipFill>
                 <a:blip r:embed="rId9"/>
                 <a:stretch>
-                  <a:fillRect l="-247" t="-18605" r="-2963" b="-27907"/>
+                  <a:fillRect l="-247" t="-18605" r="-9877" b="-27907"/>
                 </a:stretch>
               </a:blipFill>
             </p:spPr>
@@ -4858,7 +4864,7 @@
           <a:lstStyle/>
           <a:p>
             <a:pPr algn="ctr"/>
-            <a:endParaRPr lang="zh-CN" altLang="en-US"/>
+            <a:endParaRPr lang="zh-CN" altLang="en-US" b="1"/>
           </a:p>
         </p:txBody>
       </p:sp>
@@ -4904,7 +4910,7 @@
           <a:lstStyle/>
           <a:p>
             <a:pPr algn="ctr"/>
-            <a:endParaRPr lang="zh-CN" altLang="en-US"/>
+            <a:endParaRPr lang="zh-CN" altLang="en-US" b="1"/>
           </a:p>
         </p:txBody>
       </p:sp>
@@ -4950,12 +4956,12 @@
           <a:lstStyle/>
           <a:p>
             <a:pPr algn="ctr"/>
-            <a:endParaRPr lang="zh-CN" altLang="en-US"/>
-          </a:p>
-        </p:txBody>
-      </p:sp>
-      <mc:AlternateContent xmlns:mc="http://schemas.openxmlformats.org/markup-compatibility/2006">
-        <mc:Choice xmlns:a14="http://schemas.microsoft.com/office/drawing/2010/main" Requires="a14">
+            <a:endParaRPr lang="zh-CN" altLang="en-US" b="1"/>
+          </a:p>
+        </p:txBody>
+      </p:sp>
+      <mc:AlternateContent xmlns:mc="http://schemas.openxmlformats.org/markup-compatibility/2006" xmlns:a14="http://schemas.microsoft.com/office/drawing/2010/main">
+        <mc:Choice Requires="a14">
           <p:sp>
             <p:nvSpPr>
               <p:cNvPr id="86" name="文本框 85">
@@ -4984,6 +4990,7 @@
               </a:bodyPr>
               <a:lstStyle/>
               <a:p>
+                <a:pPr/>
                 <a14:m>
                   <m:oMathPara xmlns:m="http://schemas.openxmlformats.org/officeDocument/2006/math">
                     <m:oMathParaPr>
@@ -4993,30 +5000,30 @@
                       <m:sSub>
                         <m:sSubPr>
                           <m:ctrlPr>
-                            <a:rPr lang="en-US" altLang="zh-CN" sz="2400" i="1" smtClean="0">
+                            <a:rPr lang="en-US" altLang="zh-CN" sz="2400" b="1" i="1" smtClean="0">
                               <a:latin typeface="Cambria Math" panose="02040503050406030204" pitchFamily="18" charset="0"/>
                             </a:rPr>
                           </m:ctrlPr>
                         </m:sSubPr>
                         <m:e>
                           <m:r>
-                            <a:rPr lang="zh-CN" altLang="en-US" sz="2400" i="1" smtClean="0">
+                            <a:rPr lang="zh-CN" altLang="en-US" sz="2400" b="1" i="1" smtClean="0">
                               <a:latin typeface="Cambria Math" panose="02040503050406030204" pitchFamily="18" charset="0"/>
                             </a:rPr>
-                            <m:t>𝜑</m:t>
+                            <m:t>𝝋</m:t>
                           </m:r>
                         </m:e>
                         <m:sub>
                           <m:r>
-                            <a:rPr lang="en-US" altLang="zh-CN" sz="2400" b="0" i="1" smtClean="0">
+                            <a:rPr lang="en-US" altLang="zh-CN" sz="2400" b="1" i="1" smtClean="0">
                               <a:latin typeface="Cambria Math" panose="02040503050406030204" pitchFamily="18" charset="0"/>
                             </a:rPr>
-                            <m:t>𝑛</m:t>
+                            <m:t>𝒏</m:t>
                           </m:r>
                         </m:sub>
                       </m:sSub>
                       <m:r>
-                        <a:rPr lang="en-US" altLang="zh-CN" sz="2400" b="0" i="1" smtClean="0">
+                        <a:rPr lang="en-US" altLang="zh-CN" sz="2400" b="1" i="1" smtClean="0">
                           <a:latin typeface="Cambria Math" panose="02040503050406030204" pitchFamily="18" charset="0"/>
                         </a:rPr>
                         <m:t>=</m:t>
@@ -5024,30 +5031,30 @@
                       <m:f>
                         <m:fPr>
                           <m:ctrlPr>
-                            <a:rPr lang="en-US" altLang="zh-CN" sz="2400" b="0" i="1" smtClean="0">
+                            <a:rPr lang="en-US" altLang="zh-CN" sz="2400" b="1" i="1" smtClean="0">
                               <a:latin typeface="Cambria Math" panose="02040503050406030204" pitchFamily="18" charset="0"/>
                             </a:rPr>
                           </m:ctrlPr>
                         </m:fPr>
                         <m:num>
                           <m:r>
-                            <a:rPr lang="en-US" altLang="zh-CN" sz="2400" b="0" i="1" smtClean="0">
+                            <a:rPr lang="en-US" altLang="zh-CN" sz="2400" b="1" i="1" smtClean="0">
                               <a:latin typeface="Cambria Math" panose="02040503050406030204" pitchFamily="18" charset="0"/>
                             </a:rPr>
-                            <m:t>1</m:t>
+                            <m:t>𝟏</m:t>
                           </m:r>
                         </m:num>
                         <m:den>
                           <m:r>
-                            <a:rPr lang="en-US" altLang="zh-CN" sz="2400" b="0" i="1" smtClean="0">
+                            <a:rPr lang="en-US" altLang="zh-CN" sz="2400" b="1" i="1" smtClean="0">
                               <a:latin typeface="Cambria Math" panose="02040503050406030204" pitchFamily="18" charset="0"/>
                             </a:rPr>
-                            <m:t>2</m:t>
+                            <m:t>𝟐</m:t>
                           </m:r>
                         </m:den>
                       </m:f>
                       <m:r>
-                        <a:rPr lang="en-US" altLang="zh-CN" sz="2400" b="0" i="1" smtClean="0">
+                        <a:rPr lang="en-US" altLang="zh-CN" sz="2400" b="1" i="1" smtClean="0">
                           <a:latin typeface="Cambria Math" panose="02040503050406030204" pitchFamily="18" charset="0"/>
                         </a:rPr>
                         <m:t> </m:t>
@@ -5055,45 +5062,51 @@
                       <m:sSup>
                         <m:sSupPr>
                           <m:ctrlPr>
-                            <a:rPr lang="en-US" altLang="zh-CN" sz="2400" b="0" i="1" smtClean="0">
+                            <a:rPr lang="en-US" altLang="zh-CN" sz="2400" b="1" i="1" smtClean="0">
                               <a:latin typeface="Cambria Math" panose="02040503050406030204" pitchFamily="18" charset="0"/>
                             </a:rPr>
                           </m:ctrlPr>
                         </m:sSupPr>
                         <m:e>
                           <m:r>
-                            <a:rPr lang="en-US" altLang="zh-CN" sz="2400" b="0" i="1" smtClean="0">
+                            <a:rPr lang="en-US" altLang="zh-CN" sz="2400" b="1" i="1" smtClean="0">
                               <a:latin typeface="Cambria Math" panose="02040503050406030204" pitchFamily="18" charset="0"/>
                             </a:rPr>
-                            <m:t>𝑛</m:t>
+                            <m:t>𝒏</m:t>
                           </m:r>
                         </m:e>
                         <m:sup>
                           <m:r>
-                            <a:rPr lang="en-US" altLang="zh-CN" sz="2400" b="0" i="1" smtClean="0">
+                            <a:rPr lang="en-US" altLang="zh-CN" sz="2400" b="1" i="1" smtClean="0">
                               <a:latin typeface="Cambria Math" panose="02040503050406030204" pitchFamily="18" charset="0"/>
                             </a:rPr>
-                            <m:t>2 </m:t>
+                            <m:t>𝟐</m:t>
+                          </m:r>
+                          <m:r>
+                            <a:rPr lang="en-US" altLang="zh-CN" sz="2400" b="1" i="1" smtClean="0">
+                              <a:latin typeface="Cambria Math" panose="02040503050406030204" pitchFamily="18" charset="0"/>
+                            </a:rPr>
+                            <m:t> </m:t>
                           </m:r>
                         </m:sup>
                       </m:sSup>
                       <m:f>
                         <m:fPr>
                           <m:ctrlPr>
-                            <a:rPr lang="en-US" altLang="zh-CN" sz="2400" b="0" i="1" smtClean="0">
+                            <a:rPr lang="en-US" altLang="zh-CN" sz="2400" b="1" i="1" smtClean="0">
                               <a:latin typeface="Cambria Math" panose="02040503050406030204" pitchFamily="18" charset="0"/>
                             </a:rPr>
                           </m:ctrlPr>
                         </m:fPr>
                         <m:num>
                           <m:r>
-                            <a:rPr lang="en-US" altLang="zh-CN" sz="2400" b="0" i="1" smtClean="0">
+                            <a:rPr lang="en-US" altLang="zh-CN" sz="2400" b="1" i="1" smtClean="0">
                               <a:latin typeface="Cambria Math" panose="02040503050406030204" pitchFamily="18" charset="0"/>
                             </a:rPr>
-                            <m:t>360</m:t>
+                            <m:t>𝟑𝟔𝟎</m:t>
                           </m:r>
                           <m:r>
-                            <a:rPr lang="en-US" altLang="zh-CN" sz="2400" b="0" i="1" smtClean="0">
+                            <a:rPr lang="en-US" altLang="zh-CN" sz="2400" b="1" i="1" smtClean="0">
                               <a:latin typeface="Cambria Math" panose="02040503050406030204" pitchFamily="18" charset="0"/>
                               <a:ea typeface="Cambria Math" panose="02040503050406030204" pitchFamily="18" charset="0"/>
                             </a:rPr>
@@ -5102,22 +5115,22 @@
                         </m:num>
                         <m:den>
                           <m:r>
-                            <a:rPr lang="en-US" altLang="zh-CN" sz="2400" b="0" i="1" smtClean="0">
+                            <a:rPr lang="en-US" altLang="zh-CN" sz="2400" b="1" i="1" smtClean="0">
                               <a:latin typeface="Cambria Math" panose="02040503050406030204" pitchFamily="18" charset="0"/>
                             </a:rPr>
-                            <m:t>𝑁</m:t>
+                            <m:t>𝑵</m:t>
                           </m:r>
                         </m:den>
                       </m:f>
                     </m:oMath>
                   </m:oMathPara>
                 </a14:m>
-                <a:endParaRPr lang="zh-CN" altLang="en-US" sz="2400" dirty="0"/>
+                <a:endParaRPr lang="zh-CN" altLang="en-US" sz="2400" b="1" dirty="0"/>
               </a:p>
             </p:txBody>
           </p:sp>
         </mc:Choice>
-        <mc:Fallback>
+        <mc:Fallback xmlns="">
           <p:sp>
             <p:nvSpPr>
               <p:cNvPr id="86" name="文本框 85">
@@ -5162,8 +5175,8 @@
           </p:sp>
         </mc:Fallback>
       </mc:AlternateContent>
-      <mc:AlternateContent xmlns:mc="http://schemas.openxmlformats.org/markup-compatibility/2006">
-        <mc:Choice xmlns:a14="http://schemas.microsoft.com/office/drawing/2010/main" Requires="a14">
+      <mc:AlternateContent xmlns:mc="http://schemas.openxmlformats.org/markup-compatibility/2006" xmlns:a14="http://schemas.microsoft.com/office/drawing/2010/main">
+        <mc:Choice Requires="a14">
           <p:sp>
             <p:nvSpPr>
               <p:cNvPr id="87" name="文本框 86">
@@ -5192,6 +5205,7 @@
               </a:bodyPr>
               <a:lstStyle/>
               <a:p>
+                <a:pPr/>
                 <a14:m>
                   <m:oMathPara xmlns:m="http://schemas.openxmlformats.org/officeDocument/2006/math">
                     <m:oMathParaPr>
@@ -5201,37 +5215,37 @@
                       <m:sSub>
                         <m:sSubPr>
                           <m:ctrlPr>
-                            <a:rPr lang="en-US" altLang="zh-CN" sz="2400" i="1" smtClean="0">
+                            <a:rPr lang="en-US" altLang="zh-CN" sz="2400" b="1" i="1" smtClean="0">
                               <a:latin typeface="Cambria Math" panose="02040503050406030204" pitchFamily="18" charset="0"/>
                             </a:rPr>
                           </m:ctrlPr>
                         </m:sSubPr>
                         <m:e>
                           <m:r>
-                            <a:rPr lang="zh-CN" altLang="en-US" sz="2400" i="1" smtClean="0">
+                            <a:rPr lang="zh-CN" altLang="en-US" sz="2400" b="1" i="1" smtClean="0">
                               <a:latin typeface="Cambria Math" panose="02040503050406030204" pitchFamily="18" charset="0"/>
                             </a:rPr>
-                            <m:t>𝜑</m:t>
+                            <m:t>𝝋</m:t>
                           </m:r>
                         </m:e>
                         <m:sub>
                           <m:r>
-                            <a:rPr lang="en-US" altLang="zh-CN" sz="2400" b="0" i="1" smtClean="0">
+                            <a:rPr lang="en-US" altLang="zh-CN" sz="2400" b="1" i="1" smtClean="0">
                               <a:latin typeface="Cambria Math" panose="02040503050406030204" pitchFamily="18" charset="0"/>
                             </a:rPr>
-                            <m:t>1</m:t>
+                            <m:t>𝟏</m:t>
                           </m:r>
                         </m:sub>
                       </m:sSub>
                     </m:oMath>
                   </m:oMathPara>
                 </a14:m>
-                <a:endParaRPr lang="zh-CN" altLang="en-US" sz="2400" dirty="0"/>
+                <a:endParaRPr lang="zh-CN" altLang="en-US" sz="2400" b="1" dirty="0"/>
               </a:p>
             </p:txBody>
           </p:sp>
         </mc:Choice>
-        <mc:Fallback>
+        <mc:Fallback xmlns="">
           <p:sp>
             <p:nvSpPr>
               <p:cNvPr id="87" name="文本框 86">
@@ -5257,7 +5271,7 @@
               <a:blipFill>
                 <a:blip r:embed="rId11"/>
                 <a:stretch>
-                  <a:fillRect b="-9211"/>
+                  <a:fillRect b="-10526"/>
                 </a:stretch>
               </a:blipFill>
             </p:spPr>
@@ -5276,8 +5290,8 @@
           </p:sp>
         </mc:Fallback>
       </mc:AlternateContent>
-      <mc:AlternateContent xmlns:mc="http://schemas.openxmlformats.org/markup-compatibility/2006">
-        <mc:Choice xmlns:a14="http://schemas.microsoft.com/office/drawing/2010/main" Requires="a14">
+      <mc:AlternateContent xmlns:mc="http://schemas.openxmlformats.org/markup-compatibility/2006" xmlns:a14="http://schemas.microsoft.com/office/drawing/2010/main">
+        <mc:Choice Requires="a14">
           <p:sp>
             <p:nvSpPr>
               <p:cNvPr id="88" name="文本框 87">
@@ -5306,6 +5320,7 @@
               </a:bodyPr>
               <a:lstStyle/>
               <a:p>
+                <a:pPr/>
                 <a14:m>
                   <m:oMathPara xmlns:m="http://schemas.openxmlformats.org/officeDocument/2006/math">
                     <m:oMathParaPr>
@@ -5315,37 +5330,37 @@
                       <m:sSub>
                         <m:sSubPr>
                           <m:ctrlPr>
-                            <a:rPr lang="en-US" altLang="zh-CN" sz="2400" i="1" smtClean="0">
+                            <a:rPr lang="en-US" altLang="zh-CN" sz="2400" b="1" i="1" smtClean="0">
                               <a:latin typeface="Cambria Math" panose="02040503050406030204" pitchFamily="18" charset="0"/>
                             </a:rPr>
                           </m:ctrlPr>
                         </m:sSubPr>
                         <m:e>
                           <m:r>
-                            <a:rPr lang="zh-CN" altLang="en-US" sz="2400" i="1" smtClean="0">
+                            <a:rPr lang="zh-CN" altLang="en-US" sz="2400" b="1" i="1" smtClean="0">
                               <a:latin typeface="Cambria Math" panose="02040503050406030204" pitchFamily="18" charset="0"/>
                             </a:rPr>
-                            <m:t>𝜑</m:t>
+                            <m:t>𝝋</m:t>
                           </m:r>
                         </m:e>
                         <m:sub>
                           <m:r>
-                            <a:rPr lang="en-US" altLang="zh-CN" sz="2400" b="0" i="1" smtClean="0">
+                            <a:rPr lang="en-US" altLang="zh-CN" sz="2400" b="1" i="1" smtClean="0">
                               <a:latin typeface="Cambria Math" panose="02040503050406030204" pitchFamily="18" charset="0"/>
                             </a:rPr>
-                            <m:t>499</m:t>
+                            <m:t>𝟒𝟗𝟗</m:t>
                           </m:r>
                         </m:sub>
                       </m:sSub>
                     </m:oMath>
                   </m:oMathPara>
                 </a14:m>
-                <a:endParaRPr lang="zh-CN" altLang="en-US" sz="2400" dirty="0"/>
+                <a:endParaRPr lang="zh-CN" altLang="en-US" sz="2400" b="1" dirty="0"/>
               </a:p>
             </p:txBody>
           </p:sp>
         </mc:Choice>
-        <mc:Fallback>
+        <mc:Fallback xmlns="">
           <p:sp>
             <p:nvSpPr>
               <p:cNvPr id="88" name="文本框 87">
@@ -5371,7 +5386,7 @@
               <a:blipFill>
                 <a:blip r:embed="rId12"/>
                 <a:stretch>
-                  <a:fillRect l="-2830" r="-13208" b="-10526"/>
+                  <a:fillRect l="-2830" r="-24528" b="-10526"/>
                 </a:stretch>
               </a:blipFill>
             </p:spPr>
@@ -5473,10 +5488,10 @@
           <a:p>
             <a:pPr algn="ctr"/>
             <a:r>
-              <a:rPr lang="en-US" altLang="zh-CN" sz="3600" dirty="0"/>
+              <a:rPr lang="en-US" altLang="zh-CN" sz="3600" b="1" dirty="0"/>
               <a:t>Bloch Simulation</a:t>
             </a:r>
-            <a:endParaRPr lang="zh-CN" altLang="en-US" sz="3600" dirty="0"/>
+            <a:endParaRPr lang="zh-CN" altLang="en-US" sz="3600" b="1" dirty="0"/>
           </a:p>
         </p:txBody>
       </p:sp>
@@ -5523,10 +5538,10 @@
           <a:p>
             <a:pPr algn="ctr"/>
             <a:r>
-              <a:rPr lang="en-US" altLang="zh-CN" sz="3600" dirty="0"/>
+              <a:rPr lang="en-US" altLang="zh-CN" sz="3600" b="1" dirty="0"/>
               <a:t>Model Field inhomogeneous </a:t>
             </a:r>
-            <a:endParaRPr lang="zh-CN" altLang="en-US" sz="3600" dirty="0"/>
+            <a:endParaRPr lang="zh-CN" altLang="en-US" sz="3600" b="1" dirty="0"/>
           </a:p>
         </p:txBody>
       </p:sp>
@@ -5573,10 +5588,10 @@
           <a:p>
             <a:pPr algn="ctr"/>
             <a:r>
-              <a:rPr lang="en-US" altLang="zh-CN" sz="3600" dirty="0"/>
+              <a:rPr lang="en-US" altLang="zh-CN" sz="3600" b="1" dirty="0"/>
               <a:t>Model Noise</a:t>
             </a:r>
-            <a:endParaRPr lang="zh-CN" altLang="en-US" sz="3600" dirty="0"/>
+            <a:endParaRPr lang="zh-CN" altLang="en-US" sz="3600" b="1" dirty="0"/>
           </a:p>
         </p:txBody>
       </p:sp>
@@ -5622,12 +5637,12 @@
           <a:lstStyle/>
           <a:p>
             <a:pPr algn="ctr"/>
-            <a:endParaRPr lang="zh-CN" altLang="en-US"/>
-          </a:p>
-        </p:txBody>
-      </p:sp>
-      <mc:AlternateContent xmlns:mc="http://schemas.openxmlformats.org/markup-compatibility/2006">
-        <mc:Choice xmlns:a14="http://schemas.microsoft.com/office/drawing/2010/main" Requires="a14">
+            <a:endParaRPr lang="zh-CN" altLang="en-US" b="1"/>
+          </a:p>
+        </p:txBody>
+      </p:sp>
+      <mc:AlternateContent xmlns:mc="http://schemas.openxmlformats.org/markup-compatibility/2006" xmlns:a14="http://schemas.microsoft.com/office/drawing/2010/main">
+        <mc:Choice Requires="a14">
           <p:sp>
             <p:nvSpPr>
               <p:cNvPr id="98" name="文本框 97">
@@ -5657,13 +5672,13 @@
               <a:lstStyle/>
               <a:p>
                 <a:r>
-                  <a:rPr lang="en-US" altLang="zh-CN" dirty="0"/>
+                  <a:rPr lang="en-US" altLang="zh-CN" b="1" dirty="0"/>
                   <a:t>rand()+j</a:t>
                 </a:r>
                 <a14:m>
                   <m:oMath xmlns:m="http://schemas.openxmlformats.org/officeDocument/2006/math">
                     <m:r>
-                      <a:rPr lang="en-US" altLang="zh-CN" sz="1800" i="1" smtClean="0">
+                      <a:rPr lang="en-US" altLang="zh-CN" sz="1800" b="1" i="1" smtClean="0">
                         <a:latin typeface="Cambria Math" panose="02040503050406030204" pitchFamily="18" charset="0"/>
                         <a:ea typeface="Cambria Math" panose="02040503050406030204" pitchFamily="18" charset="0"/>
                       </a:rPr>
@@ -5672,15 +5687,15 @@
                   </m:oMath>
                 </a14:m>
                 <a:r>
-                  <a:rPr lang="en-US" altLang="zh-CN" dirty="0"/>
+                  <a:rPr lang="en-US" altLang="zh-CN" b="1" dirty="0"/>
                   <a:t>rand()</a:t>
                 </a:r>
-                <a:endParaRPr lang="zh-CN" altLang="en-US" dirty="0"/>
+                <a:endParaRPr lang="zh-CN" altLang="en-US" b="1" dirty="0"/>
               </a:p>
             </p:txBody>
           </p:sp>
         </mc:Choice>
-        <mc:Fallback>
+        <mc:Fallback xmlns="">
           <p:sp>
             <p:nvSpPr>
               <p:cNvPr id="98" name="文本框 97">
@@ -5725,8 +5740,8 @@
           </p:sp>
         </mc:Fallback>
       </mc:AlternateContent>
-      <mc:AlternateContent xmlns:mc="http://schemas.openxmlformats.org/markup-compatibility/2006">
-        <mc:Choice xmlns:a14="http://schemas.microsoft.com/office/drawing/2010/main" Requires="a14">
+      <mc:AlternateContent xmlns:mc="http://schemas.openxmlformats.org/markup-compatibility/2006" xmlns:a14="http://schemas.microsoft.com/office/drawing/2010/main">
+        <mc:Choice Requires="a14">
           <p:sp>
             <p:nvSpPr>
               <p:cNvPr id="99" name="文本框 98">
@@ -5755,6 +5770,7 @@
               </a:bodyPr>
               <a:lstStyle/>
               <a:p>
+                <a:pPr/>
                 <a14:m>
                   <m:oMathPara xmlns:m="http://schemas.openxmlformats.org/officeDocument/2006/math">
                     <m:oMathParaPr>
@@ -5762,56 +5778,56 @@
                     </m:oMathParaPr>
                     <m:oMath xmlns:m="http://schemas.openxmlformats.org/officeDocument/2006/math">
                       <m:r>
-                        <a:rPr lang="en-US" altLang="zh-CN" i="1" smtClean="0">
+                        <a:rPr lang="en-US" altLang="zh-CN" b="1" i="1" smtClean="0">
                           <a:latin typeface="Cambria Math" panose="02040503050406030204" pitchFamily="18" charset="0"/>
                         </a:rPr>
-                        <m:t>𝑡</m:t>
+                        <m:t>𝒕</m:t>
                       </m:r>
                       <m:r>
-                        <a:rPr lang="en-US" altLang="zh-CN" b="0" i="1" smtClean="0">
+                        <a:rPr lang="en-US" altLang="zh-CN" b="1" i="1" smtClean="0">
                           <a:latin typeface="Cambria Math" panose="02040503050406030204" pitchFamily="18" charset="0"/>
                         </a:rPr>
                         <m:t>=</m:t>
                       </m:r>
                       <m:r>
-                        <a:rPr lang="en-US" altLang="zh-CN" b="0" i="1" smtClean="0">
+                        <a:rPr lang="en-US" altLang="zh-CN" b="1" i="1" smtClean="0">
                           <a:latin typeface="Cambria Math" panose="02040503050406030204" pitchFamily="18" charset="0"/>
                         </a:rPr>
-                        <m:t>𝑇𝐸</m:t>
+                        <m:t>𝑻𝑬</m:t>
                       </m:r>
                       <m:r>
-                        <a:rPr lang="en-US" altLang="zh-CN" b="0" i="1" smtClean="0">
+                        <a:rPr lang="en-US" altLang="zh-CN" b="1" i="1" smtClean="0">
                           <a:latin typeface="Cambria Math" panose="02040503050406030204" pitchFamily="18" charset="0"/>
                         </a:rPr>
                         <m:t>+</m:t>
                       </m:r>
                       <m:r>
-                        <a:rPr lang="en-US" altLang="zh-CN" b="0" i="1" smtClean="0">
+                        <a:rPr lang="en-US" altLang="zh-CN" b="1" i="1" smtClean="0">
                           <a:latin typeface="Cambria Math" panose="02040503050406030204" pitchFamily="18" charset="0"/>
                         </a:rPr>
-                        <m:t>𝐹</m:t>
+                        <m:t>𝑭</m:t>
                       </m:r>
                       <m:r>
-                        <a:rPr lang="en-US" altLang="zh-CN" b="0" i="1" smtClean="0">
+                        <a:rPr lang="en-US" altLang="zh-CN" b="1" i="1" smtClean="0">
                           <a:latin typeface="Cambria Math" panose="02040503050406030204" pitchFamily="18" charset="0"/>
                         </a:rPr>
                         <m:t> </m:t>
                       </m:r>
                       <m:r>
-                        <a:rPr lang="en-US" altLang="zh-CN" b="0" i="1" smtClean="0">
+                        <a:rPr lang="en-US" altLang="zh-CN" b="1" i="1" smtClean="0">
                           <a:latin typeface="Cambria Math" panose="02040503050406030204" pitchFamily="18" charset="0"/>
                         </a:rPr>
-                        <m:t>𝑇𝑅</m:t>
+                        <m:t>𝑻𝑹</m:t>
                       </m:r>
                     </m:oMath>
                   </m:oMathPara>
                 </a14:m>
-                <a:endParaRPr lang="zh-CN" altLang="en-US" dirty="0"/>
+                <a:endParaRPr lang="zh-CN" altLang="en-US" b="1" dirty="0"/>
               </a:p>
             </p:txBody>
           </p:sp>
         </mc:Choice>
-        <mc:Fallback>
+        <mc:Fallback xmlns="">
           <p:sp>
             <p:nvSpPr>
               <p:cNvPr id="99" name="文本框 98">
@@ -5898,7 +5914,7 @@
           <a:lstStyle/>
           <a:p>
             <a:pPr algn="ctr"/>
-            <a:endParaRPr lang="zh-CN" altLang="en-US"/>
+            <a:endParaRPr lang="zh-CN" altLang="en-US" b="1"/>
           </a:p>
         </p:txBody>
       </p:sp>
@@ -5931,18 +5947,18 @@
           <a:lstStyle/>
           <a:p>
             <a:r>
-              <a:rPr lang="en-US" altLang="zh-CN" sz="2000" dirty="0"/>
+              <a:rPr lang="en-US" altLang="zh-CN" sz="2000" b="1" dirty="0"/>
               <a:t>Time (</a:t>
             </a:r>
             <a:r>
-              <a:rPr lang="en-US" altLang="zh-CN" sz="2000" dirty="0" err="1"/>
+              <a:rPr lang="en-US" altLang="zh-CN" sz="2000" b="1" dirty="0" err="1"/>
               <a:t>ms</a:t>
             </a:r>
             <a:r>
-              <a:rPr lang="en-US" altLang="zh-CN" sz="2000" dirty="0"/>
+              <a:rPr lang="en-US" altLang="zh-CN" sz="2000" b="1" dirty="0"/>
               <a:t>)</a:t>
             </a:r>
-            <a:endParaRPr lang="zh-CN" altLang="en-US" sz="2000" dirty="0"/>
+            <a:endParaRPr lang="zh-CN" altLang="en-US" sz="2000" b="1" dirty="0"/>
           </a:p>
         </p:txBody>
       </p:sp>
@@ -5989,10 +6005,10 @@
           <a:p>
             <a:pPr algn="ctr"/>
             <a:r>
-              <a:rPr lang="en-US" altLang="zh-CN" sz="3600" dirty="0"/>
+              <a:rPr lang="en-US" altLang="zh-CN" sz="3600" b="1" dirty="0"/>
               <a:t>Measure T2* (exponential fit)</a:t>
             </a:r>
-            <a:endParaRPr lang="zh-CN" altLang="en-US" sz="3600" dirty="0"/>
+            <a:endParaRPr lang="zh-CN" altLang="en-US" sz="3600" b="1" dirty="0"/>
           </a:p>
         </p:txBody>
       </p:sp>
@@ -6081,7 +6097,7 @@
           <a:lstStyle/>
           <a:p>
             <a:pPr algn="ctr"/>
-            <a:endParaRPr lang="zh-CN" altLang="en-US"/>
+            <a:endParaRPr lang="zh-CN" altLang="en-US" b="1"/>
           </a:p>
         </p:txBody>
       </p:sp>
@@ -6130,7 +6146,7 @@
           <a:lstStyle/>
           <a:p>
             <a:pPr algn="ctr"/>
-            <a:endParaRPr lang="zh-CN" altLang="en-US" dirty="0"/>
+            <a:endParaRPr lang="zh-CN" altLang="en-US" b="1" dirty="0"/>
           </a:p>
         </p:txBody>
       </p:sp>
@@ -6148,8 +6164,8 @@
         </p:nvSpPr>
         <p:spPr>
           <a:xfrm>
-            <a:off x="7281465" y="7083778"/>
-            <a:ext cx="5496252" cy="715461"/>
+            <a:off x="7021550" y="7117014"/>
+            <a:ext cx="6016081" cy="707886"/>
           </a:xfrm>
           <a:prstGeom prst="rect">
             <a:avLst/>
@@ -6164,7 +6180,7 @@
           <a:p>
             <a:r>
               <a:rPr lang="en-US" altLang="zh-CN" sz="4000" b="1" dirty="0"/>
-              <a:t>Model signal generation</a:t>
+              <a:t>Signal formation modelling </a:t>
             </a:r>
             <a:endParaRPr lang="zh-CN" altLang="en-US" sz="4000" b="1" dirty="0"/>
           </a:p>
@@ -6184,8 +6200,8 @@
         </p:nvSpPr>
         <p:spPr>
           <a:xfrm>
-            <a:off x="21198406" y="7078440"/>
-            <a:ext cx="8263428" cy="707886"/>
+            <a:off x="21521958" y="7119996"/>
+            <a:ext cx="6512563" cy="707886"/>
           </a:xfrm>
           <a:prstGeom prst="rect">
             <a:avLst/>
@@ -6200,7 +6216,7 @@
           <a:p>
             <a:r>
               <a:rPr lang="en-US" altLang="zh-CN" sz="4000" b="1" dirty="0"/>
-              <a:t>Model acquisition and reconstruction</a:t>
+              <a:t>Signal acquisition modelling</a:t>
             </a:r>
             <a:endParaRPr lang="zh-CN" altLang="en-US" sz="4000" b="1" dirty="0"/>
           </a:p>
@@ -6220,8 +6236,8 @@
         </p:nvSpPr>
         <p:spPr>
           <a:xfrm rot="16200000">
-            <a:off x="24549339" y="1073044"/>
-            <a:ext cx="912549" cy="10944274"/>
+            <a:off x="24555049" y="1067333"/>
+            <a:ext cx="912549" cy="10955695"/>
           </a:xfrm>
           <a:prstGeom prst="leftBrace">
             <a:avLst/>
@@ -6251,12 +6267,12 @@
           <a:lstStyle/>
           <a:p>
             <a:pPr algn="ctr"/>
-            <a:endParaRPr lang="zh-CN" altLang="en-US" dirty="0"/>
-          </a:p>
-        </p:txBody>
-      </p:sp>
-      <mc:AlternateContent xmlns:mc="http://schemas.openxmlformats.org/markup-compatibility/2006">
-        <mc:Choice xmlns:a14="http://schemas.microsoft.com/office/drawing/2010/main" Requires="a14">
+            <a:endParaRPr lang="zh-CN" altLang="en-US" b="1" dirty="0"/>
+          </a:p>
+        </p:txBody>
+      </p:sp>
+      <mc:AlternateContent xmlns:mc="http://schemas.openxmlformats.org/markup-compatibility/2006" xmlns:a14="http://schemas.microsoft.com/office/drawing/2010/main">
+        <mc:Choice Requires="a14">
           <p:sp>
             <p:nvSpPr>
               <p:cNvPr id="85" name="文本框 84">
@@ -6272,7 +6288,7 @@
             <p:spPr>
               <a:xfrm>
                 <a:off x="13987309" y="1452165"/>
-                <a:ext cx="841998" cy="539315"/>
+                <a:ext cx="841998" cy="545534"/>
               </a:xfrm>
               <a:prstGeom prst="rect">
                 <a:avLst/>
@@ -6285,6 +6301,7 @@
               </a:bodyPr>
               <a:lstStyle/>
               <a:p>
+                <a:pPr/>
                 <a14:m>
                   <m:oMathPara xmlns:m="http://schemas.openxmlformats.org/officeDocument/2006/math">
                     <m:oMathParaPr>
@@ -6294,22 +6311,22 @@
                       <m:sSup>
                         <m:sSupPr>
                           <m:ctrlPr>
-                            <a:rPr lang="en-US" altLang="zh-CN" sz="2000" i="1" smtClean="0">
+                            <a:rPr lang="en-US" altLang="zh-CN" sz="2000" b="1" i="1" smtClean="0">
                               <a:latin typeface="Cambria Math" panose="02040503050406030204" pitchFamily="18" charset="0"/>
                             </a:rPr>
                           </m:ctrlPr>
                         </m:sSupPr>
                         <m:e>
                           <m:r>
-                            <a:rPr lang="en-US" altLang="zh-CN" sz="2000" b="0" i="1" smtClean="0">
+                            <a:rPr lang="en-US" altLang="zh-CN" sz="2000" b="1" i="1" smtClean="0">
                               <a:latin typeface="Cambria Math" panose="02040503050406030204" pitchFamily="18" charset="0"/>
                             </a:rPr>
-                            <m:t>𝑒</m:t>
+                            <m:t>𝒆</m:t>
                           </m:r>
                         </m:e>
                         <m:sup>
                           <m:r>
-                            <a:rPr lang="en-US" altLang="zh-CN" sz="2000" b="0" i="1" smtClean="0">
+                            <a:rPr lang="en-US" altLang="zh-CN" sz="2000" b="1" i="1" smtClean="0">
                               <a:latin typeface="Cambria Math" panose="02040503050406030204" pitchFamily="18" charset="0"/>
                             </a:rPr>
                             <m:t>− </m:t>
@@ -6317,55 +6334,61 @@
                           <m:f>
                             <m:fPr>
                               <m:ctrlPr>
-                                <a:rPr lang="en-US" altLang="zh-CN" sz="2000" b="0" i="1" smtClean="0">
+                                <a:rPr lang="en-US" altLang="zh-CN" sz="2000" b="1" i="1" smtClean="0">
                                   <a:latin typeface="Cambria Math" panose="02040503050406030204" pitchFamily="18" charset="0"/>
                                 </a:rPr>
                               </m:ctrlPr>
                             </m:fPr>
                             <m:num>
                               <m:r>
-                                <a:rPr lang="en-US" altLang="zh-CN" sz="2000" b="0" i="1" smtClean="0">
+                                <a:rPr lang="en-US" altLang="zh-CN" sz="2000" b="1" i="1" smtClean="0">
                                   <a:latin typeface="Cambria Math" panose="02040503050406030204" pitchFamily="18" charset="0"/>
                                 </a:rPr>
-                                <m:t>𝑇𝐸</m:t>
+                                <m:t>𝑻𝑬</m:t>
                               </m:r>
                               <m:r>
-                                <a:rPr lang="en-US" altLang="zh-CN" sz="2000" b="0" i="1" smtClean="0">
+                                <a:rPr lang="en-US" altLang="zh-CN" sz="2000" b="1" i="1" smtClean="0">
                                   <a:latin typeface="Cambria Math" panose="02040503050406030204" pitchFamily="18" charset="0"/>
                                 </a:rPr>
                                 <m:t>+</m:t>
                               </m:r>
                               <m:r>
-                                <a:rPr lang="en-US" altLang="zh-CN" sz="2000" b="0" i="1" smtClean="0">
+                                <a:rPr lang="en-US" altLang="zh-CN" sz="2000" b="1" i="1" smtClean="0">
                                   <a:latin typeface="Cambria Math" panose="02040503050406030204" pitchFamily="18" charset="0"/>
                                 </a:rPr>
-                                <m:t>𝐹</m:t>
+                                <m:t>𝑭</m:t>
                               </m:r>
                               <m:r>
-                                <a:rPr lang="en-US" altLang="zh-CN" sz="2000" b="0" i="1" smtClean="0">
+                                <a:rPr lang="en-US" altLang="zh-CN" sz="2000" b="1" i="1" smtClean="0">
                                   <a:latin typeface="Cambria Math" panose="02040503050406030204" pitchFamily="18" charset="0"/>
                                 </a:rPr>
                                 <m:t> </m:t>
                               </m:r>
                               <m:r>
-                                <a:rPr lang="en-US" altLang="zh-CN" sz="2000" b="0" i="1" smtClean="0">
+                                <a:rPr lang="en-US" altLang="zh-CN" sz="2000" b="1" i="1" smtClean="0">
                                   <a:latin typeface="Cambria Math" panose="02040503050406030204" pitchFamily="18" charset="0"/>
                                 </a:rPr>
-                                <m:t>𝑇𝑅</m:t>
+                                <m:t>𝑻𝑹</m:t>
                               </m:r>
                             </m:num>
                             <m:den>
                               <m:r>
-                                <a:rPr lang="en-US" altLang="zh-CN" sz="2000" b="0" i="1" smtClean="0">
+                                <a:rPr lang="en-US" altLang="zh-CN" sz="2000" b="1" i="1" smtClean="0">
                                   <a:latin typeface="Cambria Math" panose="02040503050406030204" pitchFamily="18" charset="0"/>
                                 </a:rPr>
-                                <m:t>𝑇</m:t>
+                                <m:t>𝑻</m:t>
                               </m:r>
                               <m:r>
-                                <a:rPr lang="en-US" altLang="zh-CN" sz="2000" b="0" i="1" smtClean="0">
+                                <a:rPr lang="en-US" altLang="zh-CN" sz="2000" b="1" i="1" smtClean="0">
                                   <a:latin typeface="Cambria Math" panose="02040503050406030204" pitchFamily="18" charset="0"/>
                                 </a:rPr>
-                                <m:t>2′</m:t>
+                                <m:t>𝟐</m:t>
+                              </m:r>
+                              <m:r>
+                                <a:rPr lang="en-US" altLang="zh-CN" sz="2000" b="1" i="1" smtClean="0">
+                                  <a:latin typeface="Cambria Math" panose="02040503050406030204" pitchFamily="18" charset="0"/>
+                                </a:rPr>
+                                <m:t>′</m:t>
                               </m:r>
                             </m:den>
                           </m:f>
@@ -6374,12 +6397,12 @@
                     </m:oMath>
                   </m:oMathPara>
                 </a14:m>
-                <a:endParaRPr lang="zh-CN" altLang="en-US" dirty="0"/>
+                <a:endParaRPr lang="zh-CN" altLang="en-US" b="1" dirty="0"/>
               </a:p>
             </p:txBody>
           </p:sp>
         </mc:Choice>
-        <mc:Fallback>
+        <mc:Fallback xmlns="">
           <p:sp>
             <p:nvSpPr>
               <p:cNvPr id="85" name="文本框 84">
@@ -6397,7 +6420,7 @@
             <p:spPr>
               <a:xfrm>
                 <a:off x="13987309" y="1452165"/>
-                <a:ext cx="841998" cy="539315"/>
+                <a:ext cx="841998" cy="545534"/>
               </a:xfrm>
               <a:prstGeom prst="rect">
                 <a:avLst/>

</xml_diff>